<commit_message>
Added more to CPE
</commit_message>
<xml_diff>
--- a/modules/PPT/CPUE.pptx
+++ b/modules/PPT/CPUE.pptx
@@ -5,7 +5,7 @@
     <p:sldMasterId id="2147483648" r:id="rId1"/>
   </p:sldMasterIdLst>
   <p:notesMasterIdLst>
-    <p:notesMasterId r:id="rId10"/>
+    <p:notesMasterId r:id="rId12"/>
   </p:notesMasterIdLst>
   <p:sldIdLst>
     <p:sldId id="305" r:id="rId2"/>
@@ -14,8 +14,10 @@
     <p:sldId id="320" r:id="rId5"/>
     <p:sldId id="321" r:id="rId6"/>
     <p:sldId id="322" r:id="rId7"/>
-    <p:sldId id="323" r:id="rId8"/>
-    <p:sldId id="324" r:id="rId9"/>
+    <p:sldId id="325" r:id="rId8"/>
+    <p:sldId id="323" r:id="rId9"/>
+    <p:sldId id="326" r:id="rId10"/>
+    <p:sldId id="327" r:id="rId11"/>
   </p:sldIdLst>
   <p:sldSz cx="9144000" cy="6858000" type="screen4x3"/>
   <p:notesSz cx="6858000" cy="9144000"/>
@@ -675,6 +677,99 @@
     <p:extLst>
       <p:ext uri="{BB962C8B-B14F-4D97-AF65-F5344CB8AC3E}">
         <p14:creationId xmlns:p14="http://schemas.microsoft.com/office/powerpoint/2010/main" val="511870071"/>
+      </p:ext>
+    </p:extLst>
+  </p:cSld>
+  <p:clrMapOvr>
+    <a:masterClrMapping/>
+  </p:clrMapOvr>
+</p:notes>
+</file>
+
+<file path=ppt/notesSlides/notesSlide2.xml><?xml version="1.0" encoding="utf-8"?>
+<p:notes xmlns:a="http://schemas.openxmlformats.org/drawingml/2006/main" xmlns:r="http://schemas.openxmlformats.org/officeDocument/2006/relationships" xmlns:p="http://schemas.openxmlformats.org/presentationml/2006/main">
+  <p:cSld>
+    <p:spTree>
+      <p:nvGrpSpPr>
+        <p:cNvPr id="1" name=""/>
+        <p:cNvGrpSpPr/>
+        <p:nvPr/>
+      </p:nvGrpSpPr>
+      <p:grpSpPr>
+        <a:xfrm>
+          <a:off x="0" y="0"/>
+          <a:ext cx="0" cy="0"/>
+          <a:chOff x="0" y="0"/>
+          <a:chExt cx="0" cy="0"/>
+        </a:xfrm>
+      </p:grpSpPr>
+      <p:sp>
+        <p:nvSpPr>
+          <p:cNvPr id="2" name="Slide Image Placeholder 1"/>
+          <p:cNvSpPr>
+            <a:spLocks noGrp="1" noRot="1" noChangeAspect="1"/>
+          </p:cNvSpPr>
+          <p:nvPr>
+            <p:ph type="sldImg"/>
+          </p:nvPr>
+        </p:nvSpPr>
+        <p:spPr/>
+      </p:sp>
+      <p:sp>
+        <p:nvSpPr>
+          <p:cNvPr id="3" name="Notes Placeholder 2"/>
+          <p:cNvSpPr>
+            <a:spLocks noGrp="1"/>
+          </p:cNvSpPr>
+          <p:nvPr>
+            <p:ph type="body" idx="1"/>
+          </p:nvPr>
+        </p:nvSpPr>
+        <p:spPr/>
+        <p:txBody>
+          <a:bodyPr/>
+          <a:lstStyle/>
+          <a:p>
+            <a:r>
+              <a:rPr lang="en-US" dirty="0" smtClean="0"/>
+              <a:t>Discuss</a:t>
+            </a:r>
+            <a:r>
+              <a:rPr lang="en-US" baseline="0" dirty="0" smtClean="0"/>
+              <a:t> how it is the equation of a line, show how CPE decreases as N decreases, etc.</a:t>
+            </a:r>
+            <a:endParaRPr lang="en-US" dirty="0"/>
+          </a:p>
+        </p:txBody>
+      </p:sp>
+      <p:sp>
+        <p:nvSpPr>
+          <p:cNvPr id="4" name="Slide Number Placeholder 3"/>
+          <p:cNvSpPr>
+            <a:spLocks noGrp="1"/>
+          </p:cNvSpPr>
+          <p:nvPr>
+            <p:ph type="sldNum" sz="quarter" idx="10"/>
+          </p:nvPr>
+        </p:nvSpPr>
+        <p:spPr/>
+        <p:txBody>
+          <a:bodyPr/>
+          <a:lstStyle/>
+          <a:p>
+            <a:fld id="{1CE7A44D-BBAB-467F-8D75-6354DFFF025B}" type="slidenum">
+              <a:rPr lang="en-US" smtClean="0"/>
+              <a:pPr/>
+              <a:t>7</a:t>
+            </a:fld>
+            <a:endParaRPr lang="en-US"/>
+          </a:p>
+        </p:txBody>
+      </p:sp>
+    </p:spTree>
+    <p:extLst>
+      <p:ext uri="{BB962C8B-B14F-4D97-AF65-F5344CB8AC3E}">
+        <p14:creationId xmlns:p14="http://schemas.microsoft.com/office/powerpoint/2010/main" val="3631197725"/>
       </p:ext>
     </p:extLst>
   </p:cSld>
@@ -4435,6 +4530,650 @@
     <p:bldLst>
       <p:bldP spid="3" grpId="0" animBg="1"/>
       <p:bldP spid="2" grpId="0" animBg="1"/>
+    </p:bldLst>
+  </p:timing>
+</p:sld>
+</file>
+
+<file path=ppt/slides/slide10.xml><?xml version="1.0" encoding="utf-8"?>
+<p:sld xmlns:a="http://schemas.openxmlformats.org/drawingml/2006/main" xmlns:r="http://schemas.openxmlformats.org/officeDocument/2006/relationships" xmlns:p="http://schemas.openxmlformats.org/presentationml/2006/main">
+  <p:cSld>
+    <p:spTree>
+      <p:nvGrpSpPr>
+        <p:cNvPr id="1" name=""/>
+        <p:cNvGrpSpPr/>
+        <p:nvPr/>
+      </p:nvGrpSpPr>
+      <p:grpSpPr>
+        <a:xfrm>
+          <a:off x="0" y="0"/>
+          <a:ext cx="0" cy="0"/>
+          <a:chOff x="0" y="0"/>
+          <a:chExt cx="0" cy="0"/>
+        </a:xfrm>
+      </p:grpSpPr>
+      <p:sp>
+        <p:nvSpPr>
+          <p:cNvPr id="4" name="Footer Placeholder 3"/>
+          <p:cNvSpPr>
+            <a:spLocks noGrp="1"/>
+          </p:cNvSpPr>
+          <p:nvPr>
+            <p:ph type="ftr" sz="quarter" idx="10"/>
+          </p:nvPr>
+        </p:nvSpPr>
+        <p:spPr/>
+        <p:txBody>
+          <a:bodyPr/>
+          <a:lstStyle/>
+          <a:p>
+            <a:r>
+              <a:rPr lang="en-US" smtClean="0"/>
+              <a:t>Abundance -- CPE</a:t>
+            </a:r>
+            <a:endParaRPr lang="en-US"/>
+          </a:p>
+        </p:txBody>
+      </p:sp>
+      <p:sp>
+        <p:nvSpPr>
+          <p:cNvPr id="5" name="Slide Number Placeholder 4"/>
+          <p:cNvSpPr>
+            <a:spLocks noGrp="1"/>
+          </p:cNvSpPr>
+          <p:nvPr>
+            <p:ph type="sldNum" sz="quarter" idx="11"/>
+          </p:nvPr>
+        </p:nvSpPr>
+        <p:spPr/>
+        <p:txBody>
+          <a:bodyPr/>
+          <a:lstStyle/>
+          <a:p>
+            <a:fld id="{8B8D0034-34A8-4F4F-AD0F-588093AE7929}" type="slidenum">
+              <a:rPr lang="en-US" smtClean="0"/>
+              <a:pPr/>
+              <a:t>10</a:t>
+            </a:fld>
+            <a:endParaRPr lang="en-US"/>
+          </a:p>
+        </p:txBody>
+      </p:sp>
+      <p:sp>
+        <p:nvSpPr>
+          <p:cNvPr id="6" name="Title 1"/>
+          <p:cNvSpPr>
+            <a:spLocks noGrp="1"/>
+          </p:cNvSpPr>
+          <p:nvPr>
+            <p:ph type="title"/>
+          </p:nvPr>
+        </p:nvSpPr>
+        <p:spPr>
+          <a:xfrm>
+            <a:off x="65088" y="122238"/>
+            <a:ext cx="9012237" cy="868362"/>
+          </a:xfrm>
+        </p:spPr>
+        <p:txBody>
+          <a:bodyPr/>
+          <a:lstStyle/>
+          <a:p>
+            <a:r>
+              <a:rPr lang="en-US" dirty="0"/>
+              <a:t>Non-Constant q </a:t>
+            </a:r>
+            <a:r>
+              <a:rPr lang="en-US" dirty="0" smtClean="0"/>
+              <a:t>(</a:t>
+            </a:r>
+            <a:r>
+              <a:rPr lang="en-US" dirty="0" err="1" smtClean="0"/>
+              <a:t>Hyperdepletion</a:t>
+            </a:r>
+            <a:r>
+              <a:rPr lang="en-US" dirty="0" smtClean="0"/>
+              <a:t>)</a:t>
+            </a:r>
+            <a:endParaRPr lang="en-US" dirty="0"/>
+          </a:p>
+        </p:txBody>
+      </p:sp>
+      <p:grpSp>
+        <p:nvGrpSpPr>
+          <p:cNvPr id="18" name="Group 17"/>
+          <p:cNvGrpSpPr/>
+          <p:nvPr/>
+        </p:nvGrpSpPr>
+        <p:grpSpPr>
+          <a:xfrm>
+            <a:off x="381000" y="2209800"/>
+            <a:ext cx="3638241" cy="3422568"/>
+            <a:chOff x="2029745" y="1828800"/>
+            <a:chExt cx="3638241" cy="3422568"/>
+          </a:xfrm>
+        </p:grpSpPr>
+        <p:cxnSp>
+          <p:nvCxnSpPr>
+            <p:cNvPr id="8" name="Straight Connector 7"/>
+            <p:cNvCxnSpPr/>
+            <p:nvPr/>
+          </p:nvCxnSpPr>
+          <p:spPr>
+            <a:xfrm>
+              <a:off x="2590800" y="1828800"/>
+              <a:ext cx="0" cy="2895600"/>
+            </a:xfrm>
+            <a:prstGeom prst="line">
+              <a:avLst/>
+            </a:prstGeom>
+            <a:ln w="31750">
+              <a:solidFill>
+                <a:schemeClr val="tx1"/>
+              </a:solidFill>
+            </a:ln>
+          </p:spPr>
+          <p:style>
+            <a:lnRef idx="1">
+              <a:schemeClr val="accent1"/>
+            </a:lnRef>
+            <a:fillRef idx="0">
+              <a:schemeClr val="accent1"/>
+            </a:fillRef>
+            <a:effectRef idx="0">
+              <a:schemeClr val="accent1"/>
+            </a:effectRef>
+            <a:fontRef idx="minor">
+              <a:schemeClr val="tx1"/>
+            </a:fontRef>
+          </p:style>
+        </p:cxnSp>
+        <p:cxnSp>
+          <p:nvCxnSpPr>
+            <p:cNvPr id="10" name="Straight Connector 9"/>
+            <p:cNvCxnSpPr/>
+            <p:nvPr/>
+          </p:nvCxnSpPr>
+          <p:spPr>
+            <a:xfrm flipH="1">
+              <a:off x="2590800" y="4648200"/>
+              <a:ext cx="3048000" cy="76200"/>
+            </a:xfrm>
+            <a:prstGeom prst="line">
+              <a:avLst/>
+            </a:prstGeom>
+            <a:ln w="31750">
+              <a:solidFill>
+                <a:schemeClr val="tx1"/>
+              </a:solidFill>
+            </a:ln>
+          </p:spPr>
+          <p:style>
+            <a:lnRef idx="1">
+              <a:schemeClr val="accent1"/>
+            </a:lnRef>
+            <a:fillRef idx="0">
+              <a:schemeClr val="accent1"/>
+            </a:fillRef>
+            <a:effectRef idx="0">
+              <a:schemeClr val="accent1"/>
+            </a:effectRef>
+            <a:fontRef idx="minor">
+              <a:schemeClr val="tx1"/>
+            </a:fontRef>
+          </p:style>
+        </p:cxnSp>
+        <p:cxnSp>
+          <p:nvCxnSpPr>
+            <p:cNvPr id="13" name="Straight Connector 12"/>
+            <p:cNvCxnSpPr/>
+            <p:nvPr/>
+          </p:nvCxnSpPr>
+          <p:spPr>
+            <a:xfrm flipH="1">
+              <a:off x="2590800" y="1828800"/>
+              <a:ext cx="2819400" cy="2895600"/>
+            </a:xfrm>
+            <a:prstGeom prst="line">
+              <a:avLst/>
+            </a:prstGeom>
+            <a:ln w="19050">
+              <a:solidFill>
+                <a:schemeClr val="tx1"/>
+              </a:solidFill>
+              <a:prstDash val="dash"/>
+            </a:ln>
+          </p:spPr>
+          <p:style>
+            <a:lnRef idx="1">
+              <a:schemeClr val="accent1"/>
+            </a:lnRef>
+            <a:fillRef idx="0">
+              <a:schemeClr val="accent1"/>
+            </a:fillRef>
+            <a:effectRef idx="0">
+              <a:schemeClr val="accent1"/>
+            </a:effectRef>
+            <a:fontRef idx="minor">
+              <a:schemeClr val="tx1"/>
+            </a:fontRef>
+          </p:style>
+        </p:cxnSp>
+        <p:sp>
+          <p:nvSpPr>
+            <p:cNvPr id="16" name="TextBox 15"/>
+            <p:cNvSpPr txBox="1"/>
+            <p:nvPr/>
+          </p:nvSpPr>
+          <p:spPr>
+            <a:xfrm>
+              <a:off x="2963399" y="4728148"/>
+              <a:ext cx="2704587" cy="523220"/>
+            </a:xfrm>
+            <a:prstGeom prst="rect">
+              <a:avLst/>
+            </a:prstGeom>
+            <a:noFill/>
+          </p:spPr>
+          <p:txBody>
+            <a:bodyPr wrap="none" rtlCol="0">
+              <a:spAutoFit/>
+            </a:bodyPr>
+            <a:lstStyle/>
+            <a:p>
+              <a:r>
+                <a:rPr lang="en-US" dirty="0" smtClean="0"/>
+                <a:t>Abundance (</a:t>
+              </a:r>
+              <a:r>
+                <a:rPr lang="en-US" dirty="0" err="1" smtClean="0"/>
+                <a:t>N</a:t>
+              </a:r>
+              <a:r>
+                <a:rPr lang="en-US" baseline="-25000" dirty="0" err="1" smtClean="0"/>
+                <a:t>t</a:t>
+              </a:r>
+              <a:r>
+                <a:rPr lang="en-US" dirty="0" smtClean="0"/>
+                <a:t>)</a:t>
+              </a:r>
+              <a:endParaRPr lang="en-US" dirty="0"/>
+            </a:p>
+          </p:txBody>
+        </p:sp>
+        <p:sp>
+          <p:nvSpPr>
+            <p:cNvPr id="17" name="TextBox 16"/>
+            <p:cNvSpPr txBox="1"/>
+            <p:nvPr/>
+          </p:nvSpPr>
+          <p:spPr>
+            <a:xfrm rot="16200000">
+              <a:off x="1797469" y="3014816"/>
+              <a:ext cx="987771" cy="523220"/>
+            </a:xfrm>
+            <a:prstGeom prst="rect">
+              <a:avLst/>
+            </a:prstGeom>
+            <a:noFill/>
+          </p:spPr>
+          <p:txBody>
+            <a:bodyPr wrap="none" rtlCol="0">
+              <a:spAutoFit/>
+            </a:bodyPr>
+            <a:lstStyle/>
+            <a:p>
+              <a:r>
+                <a:rPr lang="en-US" dirty="0" err="1" smtClean="0"/>
+                <a:t>CPE</a:t>
+              </a:r>
+              <a:r>
+                <a:rPr lang="en-US" baseline="-25000" dirty="0" err="1" smtClean="0"/>
+                <a:t>t</a:t>
+              </a:r>
+              <a:endParaRPr lang="en-US" dirty="0"/>
+            </a:p>
+          </p:txBody>
+        </p:sp>
+      </p:grpSp>
+      <p:sp>
+        <p:nvSpPr>
+          <p:cNvPr id="9" name="Freeform 8"/>
+          <p:cNvSpPr/>
+          <p:nvPr/>
+        </p:nvSpPr>
+        <p:spPr>
+          <a:xfrm rot="10800000">
+            <a:off x="951875" y="2233534"/>
+            <a:ext cx="2803161" cy="2848132"/>
+          </a:xfrm>
+          <a:custGeom>
+            <a:avLst/>
+            <a:gdLst>
+              <a:gd name="connsiteX0" fmla="*/ 2803161 w 2803161"/>
+              <a:gd name="connsiteY0" fmla="*/ 0 h 2848132"/>
+              <a:gd name="connsiteX1" fmla="*/ 861935 w 2803161"/>
+              <a:gd name="connsiteY1" fmla="*/ 794479 h 2848132"/>
+              <a:gd name="connsiteX2" fmla="*/ 0 w 2803161"/>
+              <a:gd name="connsiteY2" fmla="*/ 2848132 h 2848132"/>
+            </a:gdLst>
+            <a:ahLst/>
+            <a:cxnLst>
+              <a:cxn ang="0">
+                <a:pos x="connsiteX0" y="connsiteY0"/>
+              </a:cxn>
+              <a:cxn ang="0">
+                <a:pos x="connsiteX1" y="connsiteY1"/>
+              </a:cxn>
+              <a:cxn ang="0">
+                <a:pos x="connsiteX2" y="connsiteY2"/>
+              </a:cxn>
+            </a:cxnLst>
+            <a:rect l="l" t="t" r="r" b="b"/>
+            <a:pathLst>
+              <a:path w="2803161" h="2848132">
+                <a:moveTo>
+                  <a:pt x="2803161" y="0"/>
+                </a:moveTo>
+                <a:cubicBezTo>
+                  <a:pt x="2066144" y="159895"/>
+                  <a:pt x="1329128" y="319790"/>
+                  <a:pt x="861935" y="794479"/>
+                </a:cubicBezTo>
+                <a:cubicBezTo>
+                  <a:pt x="394741" y="1269168"/>
+                  <a:pt x="197370" y="2058650"/>
+                  <a:pt x="0" y="2848132"/>
+                </a:cubicBezTo>
+              </a:path>
+            </a:pathLst>
+          </a:custGeom>
+          <a:noFill/>
+          <a:ln w="28575">
+            <a:solidFill>
+              <a:srgbClr val="0070C0"/>
+            </a:solidFill>
+          </a:ln>
+        </p:spPr>
+        <p:style>
+          <a:lnRef idx="2">
+            <a:schemeClr val="accent1">
+              <a:shade val="50000"/>
+            </a:schemeClr>
+          </a:lnRef>
+          <a:fillRef idx="1">
+            <a:schemeClr val="accent1"/>
+          </a:fillRef>
+          <a:effectRef idx="0">
+            <a:schemeClr val="accent1"/>
+          </a:effectRef>
+          <a:fontRef idx="minor">
+            <a:schemeClr val="lt1"/>
+          </a:fontRef>
+        </p:style>
+        <p:txBody>
+          <a:bodyPr rtlCol="0" anchor="ctr"/>
+          <a:lstStyle/>
+          <a:p>
+            <a:pPr algn="ctr"/>
+            <a:endParaRPr lang="en-US"/>
+          </a:p>
+        </p:txBody>
+      </p:sp>
+      <p:sp>
+        <p:nvSpPr>
+          <p:cNvPr id="12" name="TextBox 11"/>
+          <p:cNvSpPr txBox="1"/>
+          <p:nvPr/>
+        </p:nvSpPr>
+        <p:spPr>
+          <a:xfrm>
+            <a:off x="4581525" y="1996857"/>
+            <a:ext cx="4257675" cy="3108543"/>
+          </a:xfrm>
+          <a:prstGeom prst="rect">
+            <a:avLst/>
+          </a:prstGeom>
+          <a:noFill/>
+        </p:spPr>
+        <p:txBody>
+          <a:bodyPr wrap="square" rtlCol="0">
+            <a:spAutoFit/>
+          </a:bodyPr>
+          <a:lstStyle/>
+          <a:p>
+            <a:pPr marL="228600" indent="-228600">
+              <a:buFont typeface="Arial" panose="020B0604020202020204" pitchFamily="34" charset="0"/>
+              <a:buChar char="•"/>
+            </a:pPr>
+            <a:r>
+              <a:rPr lang="en-US" dirty="0" smtClean="0"/>
+              <a:t>CPE </a:t>
+            </a:r>
+            <a:r>
+              <a:rPr lang="en-US" b="1" dirty="0" smtClean="0">
+                <a:solidFill>
+                  <a:srgbClr val="0070C0"/>
+                </a:solidFill>
+              </a:rPr>
+              <a:t>under</a:t>
+            </a:r>
+            <a:r>
+              <a:rPr lang="en-US" dirty="0" smtClean="0"/>
+              <a:t>estimates abundance</a:t>
+            </a:r>
+          </a:p>
+          <a:p>
+            <a:pPr marL="228600" indent="-228600">
+              <a:buFont typeface="Arial" panose="020B0604020202020204" pitchFamily="34" charset="0"/>
+              <a:buChar char="•"/>
+            </a:pPr>
+            <a:r>
+              <a:rPr lang="en-US" dirty="0" smtClean="0"/>
+              <a:t>“Things seem worse than they really are”</a:t>
+            </a:r>
+          </a:p>
+          <a:p>
+            <a:pPr marL="228600" indent="-228600">
+              <a:buFont typeface="Arial" panose="020B0604020202020204" pitchFamily="34" charset="0"/>
+              <a:buChar char="•"/>
+            </a:pPr>
+            <a:r>
+              <a:rPr lang="en-US" dirty="0" smtClean="0"/>
+              <a:t>Common when fish get sequentially harder to catch (e.g., “spook”)</a:t>
+            </a:r>
+            <a:endParaRPr lang="en-US" dirty="0"/>
+          </a:p>
+        </p:txBody>
+      </p:sp>
+    </p:spTree>
+    <p:extLst>
+      <p:ext uri="{BB962C8B-B14F-4D97-AF65-F5344CB8AC3E}">
+        <p14:creationId xmlns:p14="http://schemas.microsoft.com/office/powerpoint/2010/main" val="1723864321"/>
+      </p:ext>
+    </p:extLst>
+  </p:cSld>
+  <p:clrMapOvr>
+    <a:masterClrMapping/>
+  </p:clrMapOvr>
+  <p:timing>
+    <p:tnLst>
+      <p:par>
+        <p:cTn id="1" dur="indefinite" restart="never" nodeType="tmRoot">
+          <p:childTnLst>
+            <p:seq concurrent="1" nextAc="seek">
+              <p:cTn id="2" dur="indefinite" nodeType="mainSeq">
+                <p:childTnLst>
+                  <p:par>
+                    <p:cTn id="3" fill="hold">
+                      <p:stCondLst>
+                        <p:cond delay="indefinite"/>
+                      </p:stCondLst>
+                      <p:childTnLst>
+                        <p:par>
+                          <p:cTn id="4" fill="hold">
+                            <p:stCondLst>
+                              <p:cond delay="0"/>
+                            </p:stCondLst>
+                            <p:childTnLst>
+                              <p:par>
+                                <p:cTn id="5" presetID="1" presetClass="entr" presetSubtype="0" fill="hold" grpId="0" nodeType="clickEffect">
+                                  <p:stCondLst>
+                                    <p:cond delay="0"/>
+                                  </p:stCondLst>
+                                  <p:childTnLst>
+                                    <p:set>
+                                      <p:cBhvr>
+                                        <p:cTn id="6" dur="1" fill="hold">
+                                          <p:stCondLst>
+                                            <p:cond delay="0"/>
+                                          </p:stCondLst>
+                                        </p:cTn>
+                                        <p:tgtEl>
+                                          <p:spTgt spid="12">
+                                            <p:txEl>
+                                              <p:pRg st="0" end="0"/>
+                                            </p:txEl>
+                                          </p:spTgt>
+                                        </p:tgtEl>
+                                        <p:attrNameLst>
+                                          <p:attrName>style.visibility</p:attrName>
+                                        </p:attrNameLst>
+                                      </p:cBhvr>
+                                      <p:to>
+                                        <p:strVal val="visible"/>
+                                      </p:to>
+                                    </p:set>
+                                  </p:childTnLst>
+                                </p:cTn>
+                              </p:par>
+                            </p:childTnLst>
+                          </p:cTn>
+                        </p:par>
+                      </p:childTnLst>
+                    </p:cTn>
+                  </p:par>
+                  <p:par>
+                    <p:cTn id="7" fill="hold">
+                      <p:stCondLst>
+                        <p:cond delay="indefinite"/>
+                      </p:stCondLst>
+                      <p:childTnLst>
+                        <p:par>
+                          <p:cTn id="8" fill="hold">
+                            <p:stCondLst>
+                              <p:cond delay="0"/>
+                            </p:stCondLst>
+                            <p:childTnLst>
+                              <p:par>
+                                <p:cTn id="9" presetID="1" presetClass="entr" presetSubtype="0" fill="hold" grpId="0" nodeType="clickEffect">
+                                  <p:stCondLst>
+                                    <p:cond delay="0"/>
+                                  </p:stCondLst>
+                                  <p:childTnLst>
+                                    <p:set>
+                                      <p:cBhvr>
+                                        <p:cTn id="10" dur="1" fill="hold">
+                                          <p:stCondLst>
+                                            <p:cond delay="0"/>
+                                          </p:stCondLst>
+                                        </p:cTn>
+                                        <p:tgtEl>
+                                          <p:spTgt spid="12">
+                                            <p:txEl>
+                                              <p:pRg st="1" end="1"/>
+                                            </p:txEl>
+                                          </p:spTgt>
+                                        </p:tgtEl>
+                                        <p:attrNameLst>
+                                          <p:attrName>style.visibility</p:attrName>
+                                        </p:attrNameLst>
+                                      </p:cBhvr>
+                                      <p:to>
+                                        <p:strVal val="visible"/>
+                                      </p:to>
+                                    </p:set>
+                                  </p:childTnLst>
+                                </p:cTn>
+                              </p:par>
+                            </p:childTnLst>
+                          </p:cTn>
+                        </p:par>
+                      </p:childTnLst>
+                    </p:cTn>
+                  </p:par>
+                  <p:par>
+                    <p:cTn id="11" fill="hold">
+                      <p:stCondLst>
+                        <p:cond delay="indefinite"/>
+                      </p:stCondLst>
+                      <p:childTnLst>
+                        <p:par>
+                          <p:cTn id="12" fill="hold">
+                            <p:stCondLst>
+                              <p:cond delay="0"/>
+                            </p:stCondLst>
+                            <p:childTnLst>
+                              <p:par>
+                                <p:cTn id="13" presetID="1" presetClass="entr" presetSubtype="0" fill="hold" grpId="0" nodeType="clickEffect">
+                                  <p:stCondLst>
+                                    <p:cond delay="0"/>
+                                  </p:stCondLst>
+                                  <p:childTnLst>
+                                    <p:set>
+                                      <p:cBhvr>
+                                        <p:cTn id="14" dur="1" fill="hold">
+                                          <p:stCondLst>
+                                            <p:cond delay="0"/>
+                                          </p:stCondLst>
+                                        </p:cTn>
+                                        <p:tgtEl>
+                                          <p:spTgt spid="12">
+                                            <p:txEl>
+                                              <p:pRg st="2" end="2"/>
+                                            </p:txEl>
+                                          </p:spTgt>
+                                        </p:tgtEl>
+                                        <p:attrNameLst>
+                                          <p:attrName>style.visibility</p:attrName>
+                                        </p:attrNameLst>
+                                      </p:cBhvr>
+                                      <p:to>
+                                        <p:strVal val="visible"/>
+                                      </p:to>
+                                    </p:set>
+                                  </p:childTnLst>
+                                </p:cTn>
+                              </p:par>
+                            </p:childTnLst>
+                          </p:cTn>
+                        </p:par>
+                      </p:childTnLst>
+                    </p:cTn>
+                  </p:par>
+                </p:childTnLst>
+              </p:cTn>
+              <p:prevCondLst>
+                <p:cond evt="onPrev" delay="0">
+                  <p:tgtEl>
+                    <p:sldTgt/>
+                  </p:tgtEl>
+                </p:cond>
+              </p:prevCondLst>
+              <p:nextCondLst>
+                <p:cond evt="onNext" delay="0">
+                  <p:tgtEl>
+                    <p:sldTgt/>
+                  </p:tgtEl>
+                </p:cond>
+              </p:nextCondLst>
+            </p:seq>
+          </p:childTnLst>
+        </p:cTn>
+      </p:par>
+    </p:tnLst>
+    <p:bldLst>
+      <p:bldP spid="12" grpId="0" uiExpand="1" build="p"/>
     </p:bldLst>
   </p:timing>
 </p:sld>
@@ -6741,7 +7480,15 @@
           <a:p>
             <a:r>
               <a:rPr lang="en-US" dirty="0" smtClean="0"/>
-              <a:t>Thus, CPE measures relative abundance</a:t>
+              <a:t>Thus, CPE measures </a:t>
+            </a:r>
+            <a:r>
+              <a:rPr lang="en-US" u="sng" dirty="0" smtClean="0"/>
+              <a:t>relative</a:t>
+            </a:r>
+            <a:r>
+              <a:rPr lang="en-US" dirty="0" smtClean="0"/>
+              <a:t> abundance</a:t>
             </a:r>
             <a:endParaRPr lang="en-US" dirty="0"/>
           </a:p>
@@ -7168,71 +7915,6 @@
       </p:grpSpPr>
       <p:sp>
         <p:nvSpPr>
-          <p:cNvPr id="2" name="Title 1"/>
-          <p:cNvSpPr>
-            <a:spLocks noGrp="1"/>
-          </p:cNvSpPr>
-          <p:nvPr>
-            <p:ph type="title"/>
-          </p:nvPr>
-        </p:nvSpPr>
-        <p:spPr>
-          <a:xfrm>
-            <a:off x="0" y="122238"/>
-            <a:ext cx="9144000" cy="868362"/>
-          </a:xfrm>
-        </p:spPr>
-        <p:txBody>
-          <a:bodyPr/>
-          <a:lstStyle/>
-          <a:p>
-            <a:r>
-              <a:rPr lang="en-US" dirty="0" smtClean="0"/>
-              <a:t>CPE Measures Relative Abundance</a:t>
-            </a:r>
-            <a:endParaRPr lang="en-US" dirty="0"/>
-          </a:p>
-        </p:txBody>
-      </p:sp>
-      <p:sp>
-        <p:nvSpPr>
-          <p:cNvPr id="3" name="Content Placeholder 2"/>
-          <p:cNvSpPr>
-            <a:spLocks noGrp="1"/>
-          </p:cNvSpPr>
-          <p:nvPr>
-            <p:ph idx="1"/>
-          </p:nvPr>
-        </p:nvSpPr>
-        <p:spPr/>
-        <p:txBody>
-          <a:bodyPr/>
-          <a:lstStyle/>
-          <a:p>
-            <a:r>
-              <a:rPr lang="en-US" dirty="0" smtClean="0"/>
-              <a:t>ONLY …</a:t>
-            </a:r>
-          </a:p>
-          <a:p>
-            <a:pPr lvl="1"/>
-            <a:r>
-              <a:rPr lang="en-US" dirty="0" smtClean="0"/>
-              <a:t>of portion of stock vulnerable to the gear</a:t>
-            </a:r>
-          </a:p>
-          <a:p>
-            <a:pPr lvl="1"/>
-            <a:r>
-              <a:rPr lang="en-US" dirty="0" smtClean="0"/>
-              <a:t>if q is constant (see readings)</a:t>
-            </a:r>
-            <a:endParaRPr lang="en-US" dirty="0"/>
-          </a:p>
-        </p:txBody>
-      </p:sp>
-      <p:sp>
-        <p:nvSpPr>
           <p:cNvPr id="4" name="Footer Placeholder 3"/>
           <p:cNvSpPr>
             <a:spLocks noGrp="1"/>
@@ -7278,10 +7960,341 @@
           </a:p>
         </p:txBody>
       </p:sp>
+      <p:grpSp>
+        <p:nvGrpSpPr>
+          <p:cNvPr id="18" name="Group 17"/>
+          <p:cNvGrpSpPr/>
+          <p:nvPr/>
+        </p:nvGrpSpPr>
+        <p:grpSpPr>
+          <a:xfrm>
+            <a:off x="381000" y="2209800"/>
+            <a:ext cx="3638241" cy="3422568"/>
+            <a:chOff x="2029745" y="1828800"/>
+            <a:chExt cx="3638241" cy="3422568"/>
+          </a:xfrm>
+        </p:grpSpPr>
+        <p:cxnSp>
+          <p:nvCxnSpPr>
+            <p:cNvPr id="8" name="Straight Connector 7"/>
+            <p:cNvCxnSpPr/>
+            <p:nvPr/>
+          </p:nvCxnSpPr>
+          <p:spPr>
+            <a:xfrm>
+              <a:off x="2590800" y="1828800"/>
+              <a:ext cx="0" cy="2895600"/>
+            </a:xfrm>
+            <a:prstGeom prst="line">
+              <a:avLst/>
+            </a:prstGeom>
+            <a:ln w="31750">
+              <a:solidFill>
+                <a:schemeClr val="tx1"/>
+              </a:solidFill>
+            </a:ln>
+          </p:spPr>
+          <p:style>
+            <a:lnRef idx="1">
+              <a:schemeClr val="accent1"/>
+            </a:lnRef>
+            <a:fillRef idx="0">
+              <a:schemeClr val="accent1"/>
+            </a:fillRef>
+            <a:effectRef idx="0">
+              <a:schemeClr val="accent1"/>
+            </a:effectRef>
+            <a:fontRef idx="minor">
+              <a:schemeClr val="tx1"/>
+            </a:fontRef>
+          </p:style>
+        </p:cxnSp>
+        <p:cxnSp>
+          <p:nvCxnSpPr>
+            <p:cNvPr id="10" name="Straight Connector 9"/>
+            <p:cNvCxnSpPr/>
+            <p:nvPr/>
+          </p:nvCxnSpPr>
+          <p:spPr>
+            <a:xfrm flipH="1">
+              <a:off x="2590800" y="4648200"/>
+              <a:ext cx="3048000" cy="76200"/>
+            </a:xfrm>
+            <a:prstGeom prst="line">
+              <a:avLst/>
+            </a:prstGeom>
+            <a:ln w="31750">
+              <a:solidFill>
+                <a:schemeClr val="tx1"/>
+              </a:solidFill>
+            </a:ln>
+          </p:spPr>
+          <p:style>
+            <a:lnRef idx="1">
+              <a:schemeClr val="accent1"/>
+            </a:lnRef>
+            <a:fillRef idx="0">
+              <a:schemeClr val="accent1"/>
+            </a:fillRef>
+            <a:effectRef idx="0">
+              <a:schemeClr val="accent1"/>
+            </a:effectRef>
+            <a:fontRef idx="minor">
+              <a:schemeClr val="tx1"/>
+            </a:fontRef>
+          </p:style>
+        </p:cxnSp>
+        <p:cxnSp>
+          <p:nvCxnSpPr>
+            <p:cNvPr id="13" name="Straight Connector 12"/>
+            <p:cNvCxnSpPr/>
+            <p:nvPr/>
+          </p:nvCxnSpPr>
+          <p:spPr>
+            <a:xfrm flipH="1">
+              <a:off x="2590800" y="1828800"/>
+              <a:ext cx="2819400" cy="2895600"/>
+            </a:xfrm>
+            <a:prstGeom prst="line">
+              <a:avLst/>
+            </a:prstGeom>
+            <a:ln w="19050">
+              <a:solidFill>
+                <a:schemeClr val="tx1"/>
+              </a:solidFill>
+              <a:prstDash val="dash"/>
+            </a:ln>
+          </p:spPr>
+          <p:style>
+            <a:lnRef idx="1">
+              <a:schemeClr val="accent1"/>
+            </a:lnRef>
+            <a:fillRef idx="0">
+              <a:schemeClr val="accent1"/>
+            </a:fillRef>
+            <a:effectRef idx="0">
+              <a:schemeClr val="accent1"/>
+            </a:effectRef>
+            <a:fontRef idx="minor">
+              <a:schemeClr val="tx1"/>
+            </a:fontRef>
+          </p:style>
+        </p:cxnSp>
+        <p:sp>
+          <p:nvSpPr>
+            <p:cNvPr id="16" name="TextBox 15"/>
+            <p:cNvSpPr txBox="1"/>
+            <p:nvPr/>
+          </p:nvSpPr>
+          <p:spPr>
+            <a:xfrm>
+              <a:off x="2963399" y="4728148"/>
+              <a:ext cx="2704587" cy="523220"/>
+            </a:xfrm>
+            <a:prstGeom prst="rect">
+              <a:avLst/>
+            </a:prstGeom>
+            <a:noFill/>
+          </p:spPr>
+          <p:txBody>
+            <a:bodyPr wrap="none" rtlCol="0">
+              <a:spAutoFit/>
+            </a:bodyPr>
+            <a:lstStyle/>
+            <a:p>
+              <a:r>
+                <a:rPr lang="en-US" dirty="0" smtClean="0"/>
+                <a:t>Abundance (</a:t>
+              </a:r>
+              <a:r>
+                <a:rPr lang="en-US" dirty="0" err="1" smtClean="0"/>
+                <a:t>N</a:t>
+              </a:r>
+              <a:r>
+                <a:rPr lang="en-US" baseline="-25000" dirty="0" err="1" smtClean="0"/>
+                <a:t>t</a:t>
+              </a:r>
+              <a:r>
+                <a:rPr lang="en-US" dirty="0" smtClean="0"/>
+                <a:t>)</a:t>
+              </a:r>
+              <a:endParaRPr lang="en-US" dirty="0"/>
+            </a:p>
+          </p:txBody>
+        </p:sp>
+        <p:sp>
+          <p:nvSpPr>
+            <p:cNvPr id="17" name="TextBox 16"/>
+            <p:cNvSpPr txBox="1"/>
+            <p:nvPr/>
+          </p:nvSpPr>
+          <p:spPr>
+            <a:xfrm rot="16200000">
+              <a:off x="1797469" y="3014816"/>
+              <a:ext cx="987771" cy="523220"/>
+            </a:xfrm>
+            <a:prstGeom prst="rect">
+              <a:avLst/>
+            </a:prstGeom>
+            <a:noFill/>
+          </p:spPr>
+          <p:txBody>
+            <a:bodyPr wrap="none" rtlCol="0">
+              <a:spAutoFit/>
+            </a:bodyPr>
+            <a:lstStyle/>
+            <a:p>
+              <a:r>
+                <a:rPr lang="en-US" dirty="0" err="1" smtClean="0"/>
+                <a:t>CPE</a:t>
+              </a:r>
+              <a:r>
+                <a:rPr lang="en-US" baseline="-25000" dirty="0" err="1" smtClean="0"/>
+                <a:t>t</a:t>
+              </a:r>
+              <a:endParaRPr lang="en-US" dirty="0"/>
+            </a:p>
+          </p:txBody>
+        </p:sp>
+      </p:grpSp>
+      <p:sp>
+        <p:nvSpPr>
+          <p:cNvPr id="20" name="Rectangle 19"/>
+          <p:cNvSpPr/>
+          <p:nvPr/>
+        </p:nvSpPr>
+        <p:spPr>
+          <a:xfrm>
+            <a:off x="1219200" y="1066800"/>
+            <a:ext cx="2324675" cy="646331"/>
+          </a:xfrm>
+          <a:prstGeom prst="rect">
+            <a:avLst/>
+          </a:prstGeom>
+        </p:spPr>
+        <p:txBody>
+          <a:bodyPr wrap="none">
+            <a:spAutoFit/>
+          </a:bodyPr>
+          <a:lstStyle/>
+          <a:p>
+            <a:pPr marL="0" lvl="2" algn="ctr"/>
+            <a:r>
+              <a:rPr lang="en-US" sz="3600" dirty="0" smtClean="0"/>
+              <a:t>C</a:t>
+            </a:r>
+            <a:r>
+              <a:rPr lang="en-US" sz="3600" baseline="-25000" dirty="0" smtClean="0"/>
+              <a:t>t</a:t>
+            </a:r>
+            <a:r>
+              <a:rPr lang="en-US" sz="3600" dirty="0" smtClean="0"/>
+              <a:t>/</a:t>
+            </a:r>
+            <a:r>
+              <a:rPr lang="en-US" sz="3600" dirty="0" err="1" smtClean="0"/>
+              <a:t>f</a:t>
+            </a:r>
+            <a:r>
+              <a:rPr lang="en-US" sz="3600" baseline="-25000" dirty="0" err="1" smtClean="0"/>
+              <a:t>t</a:t>
+            </a:r>
+            <a:r>
+              <a:rPr lang="en-US" sz="3600" dirty="0" smtClean="0"/>
+              <a:t> = q*</a:t>
+            </a:r>
+            <a:r>
+              <a:rPr lang="en-US" sz="3600" dirty="0" err="1" smtClean="0"/>
+              <a:t>N</a:t>
+            </a:r>
+            <a:r>
+              <a:rPr lang="en-US" sz="3600" baseline="-25000" dirty="0" err="1" smtClean="0"/>
+              <a:t>t</a:t>
+            </a:r>
+            <a:endParaRPr lang="en-US" sz="3600" baseline="-25000" dirty="0"/>
+          </a:p>
+        </p:txBody>
+      </p:sp>
+      <p:sp>
+        <p:nvSpPr>
+          <p:cNvPr id="21" name="TextBox 20"/>
+          <p:cNvSpPr txBox="1"/>
+          <p:nvPr/>
+        </p:nvSpPr>
+        <p:spPr>
+          <a:xfrm>
+            <a:off x="4581525" y="1996857"/>
+            <a:ext cx="4333875" cy="3108543"/>
+          </a:xfrm>
+          <a:prstGeom prst="rect">
+            <a:avLst/>
+          </a:prstGeom>
+          <a:noFill/>
+        </p:spPr>
+        <p:txBody>
+          <a:bodyPr wrap="square" rtlCol="0">
+            <a:spAutoFit/>
+          </a:bodyPr>
+          <a:lstStyle/>
+          <a:p>
+            <a:pPr marL="228600" indent="-228600">
+              <a:buFont typeface="Arial" panose="020B0604020202020204" pitchFamily="34" charset="0"/>
+              <a:buChar char="•"/>
+            </a:pPr>
+            <a:r>
+              <a:rPr lang="en-US" dirty="0" smtClean="0"/>
+              <a:t>CPE directly estimates abundance</a:t>
+            </a:r>
+            <a:endParaRPr lang="en-US" dirty="0"/>
+          </a:p>
+          <a:p>
+            <a:pPr marL="228600" indent="-228600">
+              <a:buFont typeface="Arial" panose="020B0604020202020204" pitchFamily="34" charset="0"/>
+              <a:buChar char="•"/>
+            </a:pPr>
+            <a:r>
+              <a:rPr lang="en-US" dirty="0"/>
+              <a:t>“Things seem as they really are</a:t>
+            </a:r>
+            <a:r>
+              <a:rPr lang="en-US" dirty="0" smtClean="0"/>
+              <a:t>” – i.e., if CPE de/increases then abundance de/increased proportionately</a:t>
+            </a:r>
+          </a:p>
+        </p:txBody>
+      </p:sp>
+      <p:sp>
+        <p:nvSpPr>
+          <p:cNvPr id="23" name="Title 1"/>
+          <p:cNvSpPr>
+            <a:spLocks noGrp="1"/>
+          </p:cNvSpPr>
+          <p:nvPr>
+            <p:ph type="title"/>
+          </p:nvPr>
+        </p:nvSpPr>
+        <p:spPr>
+          <a:xfrm>
+            <a:off x="0" y="122238"/>
+            <a:ext cx="9144000" cy="868362"/>
+          </a:xfrm>
+        </p:spPr>
+        <p:txBody>
+          <a:bodyPr/>
+          <a:lstStyle/>
+          <a:p>
+            <a:r>
+              <a:rPr lang="en-US" dirty="0" smtClean="0"/>
+              <a:t>CPE Measures Relative Abundance</a:t>
+            </a:r>
+            <a:endParaRPr lang="en-US" dirty="0"/>
+          </a:p>
+        </p:txBody>
+      </p:sp>
     </p:spTree>
     <p:extLst>
       <p:ext uri="{BB962C8B-B14F-4D97-AF65-F5344CB8AC3E}">
-        <p14:creationId xmlns:p14="http://schemas.microsoft.com/office/powerpoint/2010/main" val="588957937"/>
+        <p14:creationId xmlns:p14="http://schemas.microsoft.com/office/powerpoint/2010/main" val="3769326547"/>
       </p:ext>
     </p:extLst>
   </p:cSld>
@@ -7291,9 +8304,133 @@
   <p:timing>
     <p:tnLst>
       <p:par>
-        <p:cTn id="1" dur="indefinite" restart="never" nodeType="tmRoot"/>
+        <p:cTn id="1" dur="indefinite" restart="never" nodeType="tmRoot">
+          <p:childTnLst>
+            <p:seq concurrent="1" nextAc="seek">
+              <p:cTn id="2" dur="indefinite" nodeType="mainSeq">
+                <p:childTnLst>
+                  <p:par>
+                    <p:cTn id="3" fill="hold">
+                      <p:stCondLst>
+                        <p:cond delay="indefinite"/>
+                      </p:stCondLst>
+                      <p:childTnLst>
+                        <p:par>
+                          <p:cTn id="4" fill="hold">
+                            <p:stCondLst>
+                              <p:cond delay="0"/>
+                            </p:stCondLst>
+                            <p:childTnLst>
+                              <p:par>
+                                <p:cTn id="5" presetID="1" presetClass="entr" presetSubtype="0" fill="hold" grpId="0" nodeType="clickEffect">
+                                  <p:stCondLst>
+                                    <p:cond delay="0"/>
+                                  </p:stCondLst>
+                                  <p:childTnLst>
+                                    <p:set>
+                                      <p:cBhvr>
+                                        <p:cTn id="6" dur="1" fill="hold">
+                                          <p:stCondLst>
+                                            <p:cond delay="0"/>
+                                          </p:stCondLst>
+                                        </p:cTn>
+                                        <p:tgtEl>
+                                          <p:spTgt spid="21">
+                                            <p:txEl>
+                                              <p:pRg st="0" end="0"/>
+                                            </p:txEl>
+                                          </p:spTgt>
+                                        </p:tgtEl>
+                                        <p:attrNameLst>
+                                          <p:attrName>style.visibility</p:attrName>
+                                        </p:attrNameLst>
+                                      </p:cBhvr>
+                                      <p:to>
+                                        <p:strVal val="visible"/>
+                                      </p:to>
+                                    </p:set>
+                                  </p:childTnLst>
+                                </p:cTn>
+                              </p:par>
+                            </p:childTnLst>
+                          </p:cTn>
+                        </p:par>
+                      </p:childTnLst>
+                    </p:cTn>
+                  </p:par>
+                  <p:par>
+                    <p:cTn id="7" fill="hold">
+                      <p:stCondLst>
+                        <p:cond delay="indefinite"/>
+                      </p:stCondLst>
+                      <p:childTnLst>
+                        <p:par>
+                          <p:cTn id="8" fill="hold">
+                            <p:stCondLst>
+                              <p:cond delay="0"/>
+                            </p:stCondLst>
+                            <p:childTnLst>
+                              <p:par>
+                                <p:cTn id="9" presetID="1" presetClass="entr" presetSubtype="0" fill="hold" grpId="0" nodeType="clickEffect">
+                                  <p:stCondLst>
+                                    <p:cond delay="0"/>
+                                  </p:stCondLst>
+                                  <p:childTnLst>
+                                    <p:set>
+                                      <p:cBhvr>
+                                        <p:cTn id="10" dur="1" fill="hold">
+                                          <p:stCondLst>
+                                            <p:cond delay="0"/>
+                                          </p:stCondLst>
+                                        </p:cTn>
+                                        <p:tgtEl>
+                                          <p:spTgt spid="21">
+                                            <p:txEl>
+                                              <p:pRg st="1" end="1"/>
+                                            </p:txEl>
+                                          </p:spTgt>
+                                        </p:tgtEl>
+                                        <p:attrNameLst>
+                                          <p:attrName>style.visibility</p:attrName>
+                                        </p:attrNameLst>
+                                      </p:cBhvr>
+                                      <p:to>
+                                        <p:strVal val="visible"/>
+                                      </p:to>
+                                    </p:set>
+                                  </p:childTnLst>
+                                </p:cTn>
+                              </p:par>
+                            </p:childTnLst>
+                          </p:cTn>
+                        </p:par>
+                      </p:childTnLst>
+                    </p:cTn>
+                  </p:par>
+                </p:childTnLst>
+              </p:cTn>
+              <p:prevCondLst>
+                <p:cond evt="onPrev" delay="0">
+                  <p:tgtEl>
+                    <p:sldTgt/>
+                  </p:tgtEl>
+                </p:cond>
+              </p:prevCondLst>
+              <p:nextCondLst>
+                <p:cond evt="onNext" delay="0">
+                  <p:tgtEl>
+                    <p:sldTgt/>
+                  </p:tgtEl>
+                </p:cond>
+              </p:nextCondLst>
+            </p:seq>
+          </p:childTnLst>
+        </p:cTn>
       </p:par>
     </p:tnLst>
+    <p:bldLst>
+      <p:bldP spid="21" grpId="0" uiExpand="1" build="p"/>
+    </p:bldLst>
   </p:timing>
 </p:sld>
 </file>
@@ -7325,12 +8462,58 @@
             <p:ph type="title"/>
           </p:nvPr>
         </p:nvSpPr>
-        <p:spPr/>
+        <p:spPr>
+          <a:xfrm>
+            <a:off x="0" y="122238"/>
+            <a:ext cx="9144000" cy="868362"/>
+          </a:xfrm>
+        </p:spPr>
         <p:txBody>
           <a:bodyPr/>
           <a:lstStyle/>
           <a:p>
-            <a:endParaRPr lang="en-US"/>
+            <a:r>
+              <a:rPr lang="en-US" dirty="0" smtClean="0"/>
+              <a:t>CPE Measures Relative Abundance</a:t>
+            </a:r>
+            <a:endParaRPr lang="en-US" dirty="0"/>
+          </a:p>
+        </p:txBody>
+      </p:sp>
+      <p:sp>
+        <p:nvSpPr>
+          <p:cNvPr id="3" name="Content Placeholder 2"/>
+          <p:cNvSpPr>
+            <a:spLocks noGrp="1"/>
+          </p:cNvSpPr>
+          <p:nvPr>
+            <p:ph idx="1"/>
+          </p:nvPr>
+        </p:nvSpPr>
+        <p:spPr/>
+        <p:txBody>
+          <a:bodyPr/>
+          <a:lstStyle/>
+          <a:p>
+            <a:r>
+              <a:rPr lang="en-US" dirty="0" smtClean="0"/>
+              <a:t>ONLY …</a:t>
+            </a:r>
+          </a:p>
+          <a:p>
+            <a:pPr lvl="1"/>
+            <a:r>
+              <a:rPr lang="en-US" dirty="0" smtClean="0"/>
+              <a:t>of portion of stock vulnerable to the gear</a:t>
+            </a:r>
+          </a:p>
+          <a:p>
+            <a:pPr lvl="1"/>
+            <a:r>
+              <a:rPr lang="en-US" dirty="0" smtClean="0"/>
+              <a:t>if q is constant (see readings)</a:t>
+            </a:r>
+            <a:endParaRPr lang="en-US" dirty="0"/>
           </a:p>
         </p:txBody>
       </p:sp>
@@ -7381,39 +8564,10 @@
           </a:p>
         </p:txBody>
       </p:sp>
-      <p:pic>
-        <p:nvPicPr>
-          <p:cNvPr id="9" name="Picture 8"/>
-          <p:cNvPicPr>
-            <a:picLocks noChangeAspect="1"/>
-          </p:cNvPicPr>
-          <p:nvPr/>
-        </p:nvPicPr>
-        <p:blipFill rotWithShape="1">
-          <a:blip r:embed="rId2">
-            <a:extLst>
-              <a:ext uri="{28A0092B-C50C-407E-A947-70E740481C1C}">
-                <a14:useLocalDpi xmlns:a14="http://schemas.microsoft.com/office/drawing/2010/main" val="0"/>
-              </a:ext>
-            </a:extLst>
-          </a:blip>
-          <a:srcRect l="6999" t="29326" r="5001" b="4006"/>
-          <a:stretch/>
-        </p:blipFill>
-        <p:spPr>
-          <a:xfrm>
-            <a:off x="640080" y="2011680"/>
-            <a:ext cx="8046720" cy="4572000"/>
-          </a:xfrm>
-          <a:prstGeom prst="rect">
-            <a:avLst/>
-          </a:prstGeom>
-        </p:spPr>
-      </p:pic>
     </p:spTree>
     <p:extLst>
       <p:ext uri="{BB962C8B-B14F-4D97-AF65-F5344CB8AC3E}">
-        <p14:creationId xmlns:p14="http://schemas.microsoft.com/office/powerpoint/2010/main" val="2055229730"/>
+        <p14:creationId xmlns:p14="http://schemas.microsoft.com/office/powerpoint/2010/main" val="588957937"/>
       </p:ext>
     </p:extLst>
   </p:cSld>
@@ -7426,6 +8580,646 @@
         <p:cTn id="1" dur="indefinite" restart="never" nodeType="tmRoot"/>
       </p:par>
     </p:tnLst>
+  </p:timing>
+</p:sld>
+</file>
+
+<file path=ppt/slides/slide9.xml><?xml version="1.0" encoding="utf-8"?>
+<p:sld xmlns:a="http://schemas.openxmlformats.org/drawingml/2006/main" xmlns:r="http://schemas.openxmlformats.org/officeDocument/2006/relationships" xmlns:p="http://schemas.openxmlformats.org/presentationml/2006/main">
+  <p:cSld>
+    <p:spTree>
+      <p:nvGrpSpPr>
+        <p:cNvPr id="1" name=""/>
+        <p:cNvGrpSpPr/>
+        <p:nvPr/>
+      </p:nvGrpSpPr>
+      <p:grpSpPr>
+        <a:xfrm>
+          <a:off x="0" y="0"/>
+          <a:ext cx="0" cy="0"/>
+          <a:chOff x="0" y="0"/>
+          <a:chExt cx="0" cy="0"/>
+        </a:xfrm>
+      </p:grpSpPr>
+      <p:sp>
+        <p:nvSpPr>
+          <p:cNvPr id="4" name="Footer Placeholder 3"/>
+          <p:cNvSpPr>
+            <a:spLocks noGrp="1"/>
+          </p:cNvSpPr>
+          <p:nvPr>
+            <p:ph type="ftr" sz="quarter" idx="10"/>
+          </p:nvPr>
+        </p:nvSpPr>
+        <p:spPr/>
+        <p:txBody>
+          <a:bodyPr/>
+          <a:lstStyle/>
+          <a:p>
+            <a:r>
+              <a:rPr lang="en-US" smtClean="0"/>
+              <a:t>Abundance -- CPE</a:t>
+            </a:r>
+            <a:endParaRPr lang="en-US"/>
+          </a:p>
+        </p:txBody>
+      </p:sp>
+      <p:sp>
+        <p:nvSpPr>
+          <p:cNvPr id="5" name="Slide Number Placeholder 4"/>
+          <p:cNvSpPr>
+            <a:spLocks noGrp="1"/>
+          </p:cNvSpPr>
+          <p:nvPr>
+            <p:ph type="sldNum" sz="quarter" idx="11"/>
+          </p:nvPr>
+        </p:nvSpPr>
+        <p:spPr/>
+        <p:txBody>
+          <a:bodyPr/>
+          <a:lstStyle/>
+          <a:p>
+            <a:fld id="{8B8D0034-34A8-4F4F-AD0F-588093AE7929}" type="slidenum">
+              <a:rPr lang="en-US" smtClean="0"/>
+              <a:pPr/>
+              <a:t>9</a:t>
+            </a:fld>
+            <a:endParaRPr lang="en-US"/>
+          </a:p>
+        </p:txBody>
+      </p:sp>
+      <p:sp>
+        <p:nvSpPr>
+          <p:cNvPr id="6" name="Title 1"/>
+          <p:cNvSpPr>
+            <a:spLocks noGrp="1"/>
+          </p:cNvSpPr>
+          <p:nvPr>
+            <p:ph type="title"/>
+          </p:nvPr>
+        </p:nvSpPr>
+        <p:spPr>
+          <a:xfrm>
+            <a:off x="65088" y="122238"/>
+            <a:ext cx="9012237" cy="868362"/>
+          </a:xfrm>
+        </p:spPr>
+        <p:txBody>
+          <a:bodyPr/>
+          <a:lstStyle/>
+          <a:p>
+            <a:r>
+              <a:rPr lang="en-US" dirty="0" smtClean="0"/>
+              <a:t>Non-Constant q (</a:t>
+            </a:r>
+            <a:r>
+              <a:rPr lang="en-US" dirty="0" err="1" smtClean="0"/>
+              <a:t>Hyperstability</a:t>
+            </a:r>
+            <a:r>
+              <a:rPr lang="en-US" dirty="0" smtClean="0"/>
+              <a:t>)</a:t>
+            </a:r>
+            <a:endParaRPr lang="en-US" dirty="0"/>
+          </a:p>
+        </p:txBody>
+      </p:sp>
+      <p:grpSp>
+        <p:nvGrpSpPr>
+          <p:cNvPr id="18" name="Group 17"/>
+          <p:cNvGrpSpPr/>
+          <p:nvPr/>
+        </p:nvGrpSpPr>
+        <p:grpSpPr>
+          <a:xfrm>
+            <a:off x="381000" y="2209800"/>
+            <a:ext cx="3638241" cy="3422568"/>
+            <a:chOff x="2029745" y="1828800"/>
+            <a:chExt cx="3638241" cy="3422568"/>
+          </a:xfrm>
+        </p:grpSpPr>
+        <p:cxnSp>
+          <p:nvCxnSpPr>
+            <p:cNvPr id="8" name="Straight Connector 7"/>
+            <p:cNvCxnSpPr/>
+            <p:nvPr/>
+          </p:nvCxnSpPr>
+          <p:spPr>
+            <a:xfrm>
+              <a:off x="2590800" y="1828800"/>
+              <a:ext cx="0" cy="2895600"/>
+            </a:xfrm>
+            <a:prstGeom prst="line">
+              <a:avLst/>
+            </a:prstGeom>
+            <a:ln w="31750">
+              <a:solidFill>
+                <a:schemeClr val="tx1"/>
+              </a:solidFill>
+            </a:ln>
+          </p:spPr>
+          <p:style>
+            <a:lnRef idx="1">
+              <a:schemeClr val="accent1"/>
+            </a:lnRef>
+            <a:fillRef idx="0">
+              <a:schemeClr val="accent1"/>
+            </a:fillRef>
+            <a:effectRef idx="0">
+              <a:schemeClr val="accent1"/>
+            </a:effectRef>
+            <a:fontRef idx="minor">
+              <a:schemeClr val="tx1"/>
+            </a:fontRef>
+          </p:style>
+        </p:cxnSp>
+        <p:cxnSp>
+          <p:nvCxnSpPr>
+            <p:cNvPr id="10" name="Straight Connector 9"/>
+            <p:cNvCxnSpPr/>
+            <p:nvPr/>
+          </p:nvCxnSpPr>
+          <p:spPr>
+            <a:xfrm flipH="1">
+              <a:off x="2590800" y="4648200"/>
+              <a:ext cx="3048000" cy="76200"/>
+            </a:xfrm>
+            <a:prstGeom prst="line">
+              <a:avLst/>
+            </a:prstGeom>
+            <a:ln w="31750">
+              <a:solidFill>
+                <a:schemeClr val="tx1"/>
+              </a:solidFill>
+            </a:ln>
+          </p:spPr>
+          <p:style>
+            <a:lnRef idx="1">
+              <a:schemeClr val="accent1"/>
+            </a:lnRef>
+            <a:fillRef idx="0">
+              <a:schemeClr val="accent1"/>
+            </a:fillRef>
+            <a:effectRef idx="0">
+              <a:schemeClr val="accent1"/>
+            </a:effectRef>
+            <a:fontRef idx="minor">
+              <a:schemeClr val="tx1"/>
+            </a:fontRef>
+          </p:style>
+        </p:cxnSp>
+        <p:cxnSp>
+          <p:nvCxnSpPr>
+            <p:cNvPr id="13" name="Straight Connector 12"/>
+            <p:cNvCxnSpPr/>
+            <p:nvPr/>
+          </p:nvCxnSpPr>
+          <p:spPr>
+            <a:xfrm flipH="1">
+              <a:off x="2590800" y="1828800"/>
+              <a:ext cx="2819400" cy="2895600"/>
+            </a:xfrm>
+            <a:prstGeom prst="line">
+              <a:avLst/>
+            </a:prstGeom>
+            <a:ln w="19050">
+              <a:solidFill>
+                <a:schemeClr val="tx1"/>
+              </a:solidFill>
+              <a:prstDash val="dash"/>
+            </a:ln>
+          </p:spPr>
+          <p:style>
+            <a:lnRef idx="1">
+              <a:schemeClr val="accent1"/>
+            </a:lnRef>
+            <a:fillRef idx="0">
+              <a:schemeClr val="accent1"/>
+            </a:fillRef>
+            <a:effectRef idx="0">
+              <a:schemeClr val="accent1"/>
+            </a:effectRef>
+            <a:fontRef idx="minor">
+              <a:schemeClr val="tx1"/>
+            </a:fontRef>
+          </p:style>
+        </p:cxnSp>
+        <p:sp>
+          <p:nvSpPr>
+            <p:cNvPr id="16" name="TextBox 15"/>
+            <p:cNvSpPr txBox="1"/>
+            <p:nvPr/>
+          </p:nvSpPr>
+          <p:spPr>
+            <a:xfrm>
+              <a:off x="2963399" y="4728148"/>
+              <a:ext cx="2704587" cy="523220"/>
+            </a:xfrm>
+            <a:prstGeom prst="rect">
+              <a:avLst/>
+            </a:prstGeom>
+            <a:noFill/>
+          </p:spPr>
+          <p:txBody>
+            <a:bodyPr wrap="none" rtlCol="0">
+              <a:spAutoFit/>
+            </a:bodyPr>
+            <a:lstStyle/>
+            <a:p>
+              <a:r>
+                <a:rPr lang="en-US" dirty="0" smtClean="0"/>
+                <a:t>Abundance (</a:t>
+              </a:r>
+              <a:r>
+                <a:rPr lang="en-US" dirty="0" err="1" smtClean="0"/>
+                <a:t>N</a:t>
+              </a:r>
+              <a:r>
+                <a:rPr lang="en-US" baseline="-25000" dirty="0" err="1" smtClean="0"/>
+                <a:t>t</a:t>
+              </a:r>
+              <a:r>
+                <a:rPr lang="en-US" dirty="0" smtClean="0"/>
+                <a:t>)</a:t>
+              </a:r>
+              <a:endParaRPr lang="en-US" dirty="0"/>
+            </a:p>
+          </p:txBody>
+        </p:sp>
+        <p:sp>
+          <p:nvSpPr>
+            <p:cNvPr id="17" name="TextBox 16"/>
+            <p:cNvSpPr txBox="1"/>
+            <p:nvPr/>
+          </p:nvSpPr>
+          <p:spPr>
+            <a:xfrm rot="16200000">
+              <a:off x="1797469" y="3014816"/>
+              <a:ext cx="987771" cy="523220"/>
+            </a:xfrm>
+            <a:prstGeom prst="rect">
+              <a:avLst/>
+            </a:prstGeom>
+            <a:noFill/>
+          </p:spPr>
+          <p:txBody>
+            <a:bodyPr wrap="none" rtlCol="0">
+              <a:spAutoFit/>
+            </a:bodyPr>
+            <a:lstStyle/>
+            <a:p>
+              <a:r>
+                <a:rPr lang="en-US" dirty="0" err="1" smtClean="0"/>
+                <a:t>CPE</a:t>
+              </a:r>
+              <a:r>
+                <a:rPr lang="en-US" baseline="-25000" dirty="0" err="1" smtClean="0"/>
+                <a:t>t</a:t>
+              </a:r>
+              <a:endParaRPr lang="en-US" dirty="0"/>
+            </a:p>
+          </p:txBody>
+        </p:sp>
+      </p:grpSp>
+      <p:sp>
+        <p:nvSpPr>
+          <p:cNvPr id="9" name="Freeform 8"/>
+          <p:cNvSpPr/>
+          <p:nvPr/>
+        </p:nvSpPr>
+        <p:spPr>
+          <a:xfrm>
+            <a:off x="951875" y="2233534"/>
+            <a:ext cx="2803161" cy="2848132"/>
+          </a:xfrm>
+          <a:custGeom>
+            <a:avLst/>
+            <a:gdLst>
+              <a:gd name="connsiteX0" fmla="*/ 2803161 w 2803161"/>
+              <a:gd name="connsiteY0" fmla="*/ 0 h 2848132"/>
+              <a:gd name="connsiteX1" fmla="*/ 861935 w 2803161"/>
+              <a:gd name="connsiteY1" fmla="*/ 794479 h 2848132"/>
+              <a:gd name="connsiteX2" fmla="*/ 0 w 2803161"/>
+              <a:gd name="connsiteY2" fmla="*/ 2848132 h 2848132"/>
+            </a:gdLst>
+            <a:ahLst/>
+            <a:cxnLst>
+              <a:cxn ang="0">
+                <a:pos x="connsiteX0" y="connsiteY0"/>
+              </a:cxn>
+              <a:cxn ang="0">
+                <a:pos x="connsiteX1" y="connsiteY1"/>
+              </a:cxn>
+              <a:cxn ang="0">
+                <a:pos x="connsiteX2" y="connsiteY2"/>
+              </a:cxn>
+            </a:cxnLst>
+            <a:rect l="l" t="t" r="r" b="b"/>
+            <a:pathLst>
+              <a:path w="2803161" h="2848132">
+                <a:moveTo>
+                  <a:pt x="2803161" y="0"/>
+                </a:moveTo>
+                <a:cubicBezTo>
+                  <a:pt x="2066144" y="159895"/>
+                  <a:pt x="1329128" y="319790"/>
+                  <a:pt x="861935" y="794479"/>
+                </a:cubicBezTo>
+                <a:cubicBezTo>
+                  <a:pt x="394741" y="1269168"/>
+                  <a:pt x="197370" y="2058650"/>
+                  <a:pt x="0" y="2848132"/>
+                </a:cubicBezTo>
+              </a:path>
+            </a:pathLst>
+          </a:custGeom>
+          <a:noFill/>
+          <a:ln w="28575">
+            <a:solidFill>
+              <a:srgbClr val="C00000"/>
+            </a:solidFill>
+          </a:ln>
+        </p:spPr>
+        <p:style>
+          <a:lnRef idx="2">
+            <a:schemeClr val="accent1">
+              <a:shade val="50000"/>
+            </a:schemeClr>
+          </a:lnRef>
+          <a:fillRef idx="1">
+            <a:schemeClr val="accent1"/>
+          </a:fillRef>
+          <a:effectRef idx="0">
+            <a:schemeClr val="accent1"/>
+          </a:effectRef>
+          <a:fontRef idx="minor">
+            <a:schemeClr val="lt1"/>
+          </a:fontRef>
+        </p:style>
+        <p:txBody>
+          <a:bodyPr rtlCol="0" anchor="ctr"/>
+          <a:lstStyle/>
+          <a:p>
+            <a:pPr algn="ctr"/>
+            <a:endParaRPr lang="en-US"/>
+          </a:p>
+        </p:txBody>
+      </p:sp>
+      <p:sp>
+        <p:nvSpPr>
+          <p:cNvPr id="11" name="TextBox 10"/>
+          <p:cNvSpPr txBox="1"/>
+          <p:nvPr/>
+        </p:nvSpPr>
+        <p:spPr>
+          <a:xfrm>
+            <a:off x="4581525" y="1996857"/>
+            <a:ext cx="4257675" cy="3108543"/>
+          </a:xfrm>
+          <a:prstGeom prst="rect">
+            <a:avLst/>
+          </a:prstGeom>
+          <a:noFill/>
+        </p:spPr>
+        <p:txBody>
+          <a:bodyPr wrap="square" rtlCol="0">
+            <a:spAutoFit/>
+          </a:bodyPr>
+          <a:lstStyle/>
+          <a:p>
+            <a:pPr marL="228600" indent="-228600">
+              <a:buFont typeface="Arial" panose="020B0604020202020204" pitchFamily="34" charset="0"/>
+              <a:buChar char="•"/>
+            </a:pPr>
+            <a:r>
+              <a:rPr lang="en-US" dirty="0" smtClean="0"/>
+              <a:t>CPE </a:t>
+            </a:r>
+            <a:r>
+              <a:rPr lang="en-US" b="1" dirty="0" smtClean="0">
+                <a:solidFill>
+                  <a:srgbClr val="C00000"/>
+                </a:solidFill>
+              </a:rPr>
+              <a:t>over</a:t>
+            </a:r>
+            <a:r>
+              <a:rPr lang="en-US" dirty="0" smtClean="0"/>
+              <a:t>estimates abundance</a:t>
+            </a:r>
+          </a:p>
+          <a:p>
+            <a:pPr marL="228600" indent="-228600">
+              <a:buFont typeface="Arial" panose="020B0604020202020204" pitchFamily="34" charset="0"/>
+              <a:buChar char="•"/>
+            </a:pPr>
+            <a:r>
+              <a:rPr lang="en-US" dirty="0" smtClean="0"/>
+              <a:t>“Things seem better than they really are”</a:t>
+            </a:r>
+          </a:p>
+          <a:p>
+            <a:pPr marL="228600" indent="-228600">
+              <a:buFont typeface="Arial" panose="020B0604020202020204" pitchFamily="34" charset="0"/>
+              <a:buChar char="•"/>
+            </a:pPr>
+            <a:r>
+              <a:rPr lang="en-US" dirty="0" smtClean="0"/>
+              <a:t>Common when fisheries are good at searching and finding fish</a:t>
+            </a:r>
+            <a:endParaRPr lang="en-US" dirty="0"/>
+          </a:p>
+        </p:txBody>
+      </p:sp>
+    </p:spTree>
+    <p:extLst>
+      <p:ext uri="{BB962C8B-B14F-4D97-AF65-F5344CB8AC3E}">
+        <p14:creationId xmlns:p14="http://schemas.microsoft.com/office/powerpoint/2010/main" val="3139710844"/>
+      </p:ext>
+    </p:extLst>
+  </p:cSld>
+  <p:clrMapOvr>
+    <a:masterClrMapping/>
+  </p:clrMapOvr>
+  <p:timing>
+    <p:tnLst>
+      <p:par>
+        <p:cTn id="1" dur="indefinite" restart="never" nodeType="tmRoot">
+          <p:childTnLst>
+            <p:seq concurrent="1" nextAc="seek">
+              <p:cTn id="2" dur="indefinite" nodeType="mainSeq">
+                <p:childTnLst>
+                  <p:par>
+                    <p:cTn id="3" fill="hold">
+                      <p:stCondLst>
+                        <p:cond delay="indefinite"/>
+                      </p:stCondLst>
+                      <p:childTnLst>
+                        <p:par>
+                          <p:cTn id="4" fill="hold">
+                            <p:stCondLst>
+                              <p:cond delay="0"/>
+                            </p:stCondLst>
+                            <p:childTnLst>
+                              <p:par>
+                                <p:cTn id="5" presetID="1" presetClass="entr" presetSubtype="0" fill="hold" grpId="0" nodeType="clickEffect">
+                                  <p:stCondLst>
+                                    <p:cond delay="0"/>
+                                  </p:stCondLst>
+                                  <p:childTnLst>
+                                    <p:set>
+                                      <p:cBhvr>
+                                        <p:cTn id="6" dur="1" fill="hold">
+                                          <p:stCondLst>
+                                            <p:cond delay="0"/>
+                                          </p:stCondLst>
+                                        </p:cTn>
+                                        <p:tgtEl>
+                                          <p:spTgt spid="11">
+                                            <p:txEl>
+                                              <p:pRg st="0" end="0"/>
+                                            </p:txEl>
+                                          </p:spTgt>
+                                        </p:tgtEl>
+                                        <p:attrNameLst>
+                                          <p:attrName>style.visibility</p:attrName>
+                                        </p:attrNameLst>
+                                      </p:cBhvr>
+                                      <p:to>
+                                        <p:strVal val="visible"/>
+                                      </p:to>
+                                    </p:set>
+                                  </p:childTnLst>
+                                </p:cTn>
+                              </p:par>
+                            </p:childTnLst>
+                          </p:cTn>
+                        </p:par>
+                      </p:childTnLst>
+                    </p:cTn>
+                  </p:par>
+                  <p:par>
+                    <p:cTn id="7" fill="hold">
+                      <p:stCondLst>
+                        <p:cond delay="indefinite"/>
+                      </p:stCondLst>
+                      <p:childTnLst>
+                        <p:par>
+                          <p:cTn id="8" fill="hold">
+                            <p:stCondLst>
+                              <p:cond delay="0"/>
+                            </p:stCondLst>
+                            <p:childTnLst>
+                              <p:par>
+                                <p:cTn id="9" presetID="1" presetClass="entr" presetSubtype="0" fill="hold" grpId="0" nodeType="clickEffect">
+                                  <p:stCondLst>
+                                    <p:cond delay="0"/>
+                                  </p:stCondLst>
+                                  <p:childTnLst>
+                                    <p:set>
+                                      <p:cBhvr>
+                                        <p:cTn id="10" dur="1" fill="hold">
+                                          <p:stCondLst>
+                                            <p:cond delay="0"/>
+                                          </p:stCondLst>
+                                        </p:cTn>
+                                        <p:tgtEl>
+                                          <p:spTgt spid="11">
+                                            <p:txEl>
+                                              <p:pRg st="1" end="1"/>
+                                            </p:txEl>
+                                          </p:spTgt>
+                                        </p:tgtEl>
+                                        <p:attrNameLst>
+                                          <p:attrName>style.visibility</p:attrName>
+                                        </p:attrNameLst>
+                                      </p:cBhvr>
+                                      <p:to>
+                                        <p:strVal val="visible"/>
+                                      </p:to>
+                                    </p:set>
+                                  </p:childTnLst>
+                                </p:cTn>
+                              </p:par>
+                            </p:childTnLst>
+                          </p:cTn>
+                        </p:par>
+                      </p:childTnLst>
+                    </p:cTn>
+                  </p:par>
+                  <p:par>
+                    <p:cTn id="11" fill="hold">
+                      <p:stCondLst>
+                        <p:cond delay="indefinite"/>
+                      </p:stCondLst>
+                      <p:childTnLst>
+                        <p:par>
+                          <p:cTn id="12" fill="hold">
+                            <p:stCondLst>
+                              <p:cond delay="0"/>
+                            </p:stCondLst>
+                            <p:childTnLst>
+                              <p:par>
+                                <p:cTn id="13" presetID="1" presetClass="entr" presetSubtype="0" fill="hold" grpId="0" nodeType="clickEffect">
+                                  <p:stCondLst>
+                                    <p:cond delay="0"/>
+                                  </p:stCondLst>
+                                  <p:childTnLst>
+                                    <p:set>
+                                      <p:cBhvr>
+                                        <p:cTn id="14" dur="1" fill="hold">
+                                          <p:stCondLst>
+                                            <p:cond delay="0"/>
+                                          </p:stCondLst>
+                                        </p:cTn>
+                                        <p:tgtEl>
+                                          <p:spTgt spid="11">
+                                            <p:txEl>
+                                              <p:pRg st="2" end="2"/>
+                                            </p:txEl>
+                                          </p:spTgt>
+                                        </p:tgtEl>
+                                        <p:attrNameLst>
+                                          <p:attrName>style.visibility</p:attrName>
+                                        </p:attrNameLst>
+                                      </p:cBhvr>
+                                      <p:to>
+                                        <p:strVal val="visible"/>
+                                      </p:to>
+                                    </p:set>
+                                  </p:childTnLst>
+                                </p:cTn>
+                              </p:par>
+                            </p:childTnLst>
+                          </p:cTn>
+                        </p:par>
+                      </p:childTnLst>
+                    </p:cTn>
+                  </p:par>
+                </p:childTnLst>
+              </p:cTn>
+              <p:prevCondLst>
+                <p:cond evt="onPrev" delay="0">
+                  <p:tgtEl>
+                    <p:sldTgt/>
+                  </p:tgtEl>
+                </p:cond>
+              </p:prevCondLst>
+              <p:nextCondLst>
+                <p:cond evt="onNext" delay="0">
+                  <p:tgtEl>
+                    <p:sldTgt/>
+                  </p:tgtEl>
+                </p:cond>
+              </p:nextCondLst>
+            </p:seq>
+          </p:childTnLst>
+        </p:cTn>
+      </p:par>
+    </p:tnLst>
+    <p:bldLst>
+      <p:bldP spid="11" grpId="0" uiExpand="1" build="p"/>
+    </p:bldLst>
   </p:timing>
 </p:sld>
 </file>

</xml_diff>

<commit_message>
Updates (mostly scripts for class exercises)
</commit_message>
<xml_diff>
--- a/modules/PPT/CPUE.pptx
+++ b/modules/PPT/CPUE.pptx
@@ -7394,12 +7394,24 @@
             </a:r>
             <a:r>
               <a:rPr lang="en-US" dirty="0"/>
-              <a:t>one unit of effort</a:t>
-            </a:r>
+              <a:t>one unit of </a:t>
+            </a:r>
+            <a:r>
+              <a:rPr lang="en-US" dirty="0" smtClean="0"/>
+              <a:t>effort</a:t>
+            </a:r>
+          </a:p>
+          <a:p>
+            <a:pPr lvl="3"/>
+            <a:r>
+              <a:rPr lang="en-US" dirty="0" smtClean="0"/>
+              <a:t>As long as effort is small (we will talk more about this later)</a:t>
+            </a:r>
+            <a:endParaRPr lang="en-US" dirty="0"/>
           </a:p>
           <a:p>
             <a:pPr lvl="1"/>
-            <a:endParaRPr lang="en-US" sz="1400" dirty="0" smtClean="0"/>
+            <a:endParaRPr lang="en-US" sz="1000" dirty="0" smtClean="0"/>
           </a:p>
           <a:p>
             <a:pPr lvl="1"/>
@@ -7475,7 +7487,7 @@
             <a:pPr marL="457200" lvl="1" indent="0">
               <a:buNone/>
             </a:pPr>
-            <a:endParaRPr lang="en-US" baseline="-25000" dirty="0"/>
+            <a:endParaRPr lang="en-US" sz="1600" baseline="-25000" dirty="0"/>
           </a:p>
           <a:p>
             <a:r>
@@ -7635,33 +7647,15 @@
                                   </p:childTnLst>
                                 </p:cTn>
                               </p:par>
-                            </p:childTnLst>
-                          </p:cTn>
-                        </p:par>
-                      </p:childTnLst>
-                    </p:cTn>
-                  </p:par>
-                  <p:par>
-                    <p:cTn id="13" fill="hold">
-                      <p:stCondLst>
-                        <p:cond delay="indefinite"/>
-                      </p:stCondLst>
-                      <p:childTnLst>
-                        <p:par>
-                          <p:cTn id="14" fill="hold">
-                            <p:stCondLst>
-                              <p:cond delay="0"/>
-                            </p:stCondLst>
-                            <p:childTnLst>
                               <p:par>
-                                <p:cTn id="15" presetID="1" presetClass="entr" presetSubtype="0" fill="hold" grpId="0" nodeType="clickEffect">
+                                <p:cTn id="13" presetID="1" presetClass="entr" presetSubtype="0" fill="hold" grpId="0" nodeType="withEffect">
                                   <p:stCondLst>
                                     <p:cond delay="0"/>
                                   </p:stCondLst>
                                   <p:childTnLst>
                                     <p:set>
                                       <p:cBhvr>
-                                        <p:cTn id="16" dur="1" fill="hold">
+                                        <p:cTn id="14" dur="1" fill="hold">
                                           <p:stCondLst>
                                             <p:cond delay="0"/>
                                           </p:stCondLst>
@@ -7669,7 +7663,7 @@
                                         <p:tgtEl>
                                           <p:spTgt spid="6">
                                             <p:txEl>
-                                              <p:pRg st="6" end="6"/>
+                                              <p:pRg st="5" end="5"/>
                                             </p:txEl>
                                           </p:spTgt>
                                         </p:tgtEl>
@@ -7684,8 +7678,26 @@
                                   </p:childTnLst>
                                 </p:cTn>
                               </p:par>
+                            </p:childTnLst>
+                          </p:cTn>
+                        </p:par>
+                      </p:childTnLst>
+                    </p:cTn>
+                  </p:par>
+                  <p:par>
+                    <p:cTn id="15" fill="hold">
+                      <p:stCondLst>
+                        <p:cond delay="indefinite"/>
+                      </p:stCondLst>
+                      <p:childTnLst>
+                        <p:par>
+                          <p:cTn id="16" fill="hold">
+                            <p:stCondLst>
+                              <p:cond delay="0"/>
+                            </p:stCondLst>
+                            <p:childTnLst>
                               <p:par>
-                                <p:cTn id="17" presetID="1" presetClass="entr" presetSubtype="0" fill="hold" grpId="0" nodeType="withEffect">
+                                <p:cTn id="17" presetID="1" presetClass="entr" presetSubtype="0" fill="hold" grpId="0" nodeType="clickEffect">
                                   <p:stCondLst>
                                     <p:cond delay="0"/>
                                   </p:stCondLst>
@@ -7715,33 +7727,15 @@
                                   </p:childTnLst>
                                 </p:cTn>
                               </p:par>
-                            </p:childTnLst>
-                          </p:cTn>
-                        </p:par>
-                      </p:childTnLst>
-                    </p:cTn>
-                  </p:par>
-                  <p:par>
-                    <p:cTn id="19" fill="hold">
-                      <p:stCondLst>
-                        <p:cond delay="indefinite"/>
-                      </p:stCondLst>
-                      <p:childTnLst>
-                        <p:par>
-                          <p:cTn id="20" fill="hold">
-                            <p:stCondLst>
-                              <p:cond delay="0"/>
-                            </p:stCondLst>
-                            <p:childTnLst>
                               <p:par>
-                                <p:cTn id="21" presetID="1" presetClass="entr" presetSubtype="0" fill="hold" grpId="0" nodeType="clickEffect">
+                                <p:cTn id="19" presetID="1" presetClass="entr" presetSubtype="0" fill="hold" grpId="0" nodeType="withEffect">
                                   <p:stCondLst>
                                     <p:cond delay="0"/>
                                   </p:stCondLst>
                                   <p:childTnLst>
                                     <p:set>
                                       <p:cBhvr>
-                                        <p:cTn id="22" dur="1" fill="hold">
+                                        <p:cTn id="20" dur="1" fill="hold">
                                           <p:stCondLst>
                                             <p:cond delay="0"/>
                                           </p:stCondLst>
@@ -7771,26 +7765,26 @@
                     </p:cTn>
                   </p:par>
                   <p:par>
-                    <p:cTn id="23" fill="hold">
+                    <p:cTn id="21" fill="hold">
                       <p:stCondLst>
                         <p:cond delay="indefinite"/>
                       </p:stCondLst>
                       <p:childTnLst>
                         <p:par>
-                          <p:cTn id="24" fill="hold">
+                          <p:cTn id="22" fill="hold">
                             <p:stCondLst>
                               <p:cond delay="0"/>
                             </p:stCondLst>
                             <p:childTnLst>
                               <p:par>
-                                <p:cTn id="25" presetID="1" presetClass="entr" presetSubtype="0" fill="hold" grpId="0" nodeType="clickEffect">
+                                <p:cTn id="23" presetID="1" presetClass="entr" presetSubtype="0" fill="hold" grpId="0" nodeType="clickEffect">
                                   <p:stCondLst>
                                     <p:cond delay="0"/>
                                   </p:stCondLst>
                                   <p:childTnLst>
                                     <p:set>
                                       <p:cBhvr>
-                                        <p:cTn id="26" dur="1" fill="hold">
+                                        <p:cTn id="24" dur="1" fill="hold">
                                           <p:stCondLst>
                                             <p:cond delay="0"/>
                                           </p:stCondLst>
@@ -7820,26 +7814,26 @@
                     </p:cTn>
                   </p:par>
                   <p:par>
-                    <p:cTn id="27" fill="hold">
+                    <p:cTn id="25" fill="hold">
                       <p:stCondLst>
                         <p:cond delay="indefinite"/>
                       </p:stCondLst>
                       <p:childTnLst>
                         <p:par>
-                          <p:cTn id="28" fill="hold">
+                          <p:cTn id="26" fill="hold">
                             <p:stCondLst>
                               <p:cond delay="0"/>
                             </p:stCondLst>
                             <p:childTnLst>
                               <p:par>
-                                <p:cTn id="29" presetID="1" presetClass="entr" presetSubtype="0" fill="hold" grpId="0" nodeType="clickEffect">
+                                <p:cTn id="27" presetID="1" presetClass="entr" presetSubtype="0" fill="hold" grpId="0" nodeType="clickEffect">
                                   <p:stCondLst>
                                     <p:cond delay="0"/>
                                   </p:stCondLst>
                                   <p:childTnLst>
                                     <p:set>
                                       <p:cBhvr>
-                                        <p:cTn id="30" dur="1" fill="hold">
+                                        <p:cTn id="28" dur="1" fill="hold">
                                           <p:stCondLst>
                                             <p:cond delay="0"/>
                                           </p:stCondLst>
@@ -7847,7 +7841,56 @@
                                         <p:tgtEl>
                                           <p:spTgt spid="6">
                                             <p:txEl>
-                                              <p:pRg st="11" end="11"/>
+                                              <p:pRg st="10" end="10"/>
+                                            </p:txEl>
+                                          </p:spTgt>
+                                        </p:tgtEl>
+                                        <p:attrNameLst>
+                                          <p:attrName>style.visibility</p:attrName>
+                                        </p:attrNameLst>
+                                      </p:cBhvr>
+                                      <p:to>
+                                        <p:strVal val="visible"/>
+                                      </p:to>
+                                    </p:set>
+                                  </p:childTnLst>
+                                </p:cTn>
+                              </p:par>
+                            </p:childTnLst>
+                          </p:cTn>
+                        </p:par>
+                      </p:childTnLst>
+                    </p:cTn>
+                  </p:par>
+                  <p:par>
+                    <p:cTn id="29" fill="hold">
+                      <p:stCondLst>
+                        <p:cond delay="indefinite"/>
+                      </p:stCondLst>
+                      <p:childTnLst>
+                        <p:par>
+                          <p:cTn id="30" fill="hold">
+                            <p:stCondLst>
+                              <p:cond delay="0"/>
+                            </p:stCondLst>
+                            <p:childTnLst>
+                              <p:par>
+                                <p:cTn id="31" presetID="1" presetClass="entr" presetSubtype="0" fill="hold" grpId="0" nodeType="clickEffect">
+                                  <p:stCondLst>
+                                    <p:cond delay="0"/>
+                                  </p:stCondLst>
+                                  <p:childTnLst>
+                                    <p:set>
+                                      <p:cBhvr>
+                                        <p:cTn id="32" dur="1" fill="hold">
+                                          <p:stCondLst>
+                                            <p:cond delay="0"/>
+                                          </p:stCondLst>
+                                        </p:cTn>
+                                        <p:tgtEl>
+                                          <p:spTgt spid="6">
+                                            <p:txEl>
+                                              <p:pRg st="12" end="12"/>
                                             </p:txEl>
                                           </p:spTgt>
                                         </p:tgtEl>

</xml_diff>